<commit_message>
Finished presentation - hopefully
</commit_message>
<xml_diff>
--- a/Project Presentation.pptx
+++ b/Project Presentation.pptx
@@ -11,6 +11,17 @@
     <p:sldId id="260" r:id="rId5"/>
     <p:sldId id="261" r:id="rId6"/>
     <p:sldId id="263" r:id="rId7"/>
+    <p:sldId id="264" r:id="rId8"/>
+    <p:sldId id="266" r:id="rId9"/>
+    <p:sldId id="267" r:id="rId10"/>
+    <p:sldId id="268" r:id="rId11"/>
+    <p:sldId id="269" r:id="rId12"/>
+    <p:sldId id="270" r:id="rId13"/>
+    <p:sldId id="271" r:id="rId14"/>
+    <p:sldId id="272" r:id="rId15"/>
+    <p:sldId id="273" r:id="rId16"/>
+    <p:sldId id="274" r:id="rId17"/>
+    <p:sldId id="275" r:id="rId18"/>
   </p:sldIdLst>
   <p:sldSz cx="12192000" cy="6858000"/>
   <p:notesSz cx="6858000" cy="9144000"/>
@@ -109,6 +120,11 @@
       </a:defRPr>
     </a:lvl9pPr>
   </p:defaultTextStyle>
+  <p:extLst>
+    <p:ext uri="{EFAFB233-063F-42B5-8137-9DF3F51BA10A}">
+      <p15:sldGuideLst xmlns:p15="http://schemas.microsoft.com/office/powerpoint/2012/main"/>
+    </p:ext>
+  </p:extLst>
 </p:presentation>
 </file>
 
@@ -5845,6 +5861,1228 @@
 </p:sld>
 </file>
 
+<file path=ppt/slides/slide10.xml><?xml version="1.0" encoding="utf-8"?>
+<p:sld xmlns:a="http://schemas.openxmlformats.org/drawingml/2006/main" xmlns:r="http://schemas.openxmlformats.org/officeDocument/2006/relationships" xmlns:p="http://schemas.openxmlformats.org/presentationml/2006/main">
+  <p:cSld>
+    <p:bg>
+      <p:bgPr>
+        <a:blipFill>
+          <a:blip r:embed="rId2"/>
+          <a:stretch/>
+        </a:blipFill>
+        <a:effectLst/>
+      </p:bgPr>
+    </p:bg>
+    <p:spTree>
+      <p:nvGrpSpPr>
+        <p:cNvPr id="1" name=""/>
+        <p:cNvGrpSpPr/>
+        <p:nvPr/>
+      </p:nvGrpSpPr>
+      <p:grpSpPr>
+        <a:xfrm>
+          <a:off x="0" y="0"/>
+          <a:ext cx="0" cy="0"/>
+          <a:chOff x="0" y="0"/>
+          <a:chExt cx="0" cy="0"/>
+        </a:xfrm>
+      </p:grpSpPr>
+      <p:pic>
+        <p:nvPicPr>
+          <p:cNvPr id="3" name="Picture 2">
+            <a:extLst>
+              <a:ext uri="{FF2B5EF4-FFF2-40B4-BE49-F238E27FC236}">
+                <a16:creationId xmlns:a16="http://schemas.microsoft.com/office/drawing/2014/main" id="{33E0833D-DF07-42E7-BC07-D8CBBC852952}"/>
+              </a:ext>
+            </a:extLst>
+          </p:cNvPr>
+          <p:cNvPicPr>
+            <a:picLocks noChangeAspect="1"/>
+          </p:cNvPicPr>
+          <p:nvPr/>
+        </p:nvPicPr>
+        <p:blipFill>
+          <a:blip r:embed="rId3"/>
+          <a:stretch>
+            <a:fillRect/>
+          </a:stretch>
+        </p:blipFill>
+        <p:spPr>
+          <a:xfrm>
+            <a:off x="5252627" y="0"/>
+            <a:ext cx="5274184" cy="6858000"/>
+          </a:xfrm>
+          <a:prstGeom prst="rect">
+            <a:avLst/>
+          </a:prstGeom>
+        </p:spPr>
+      </p:pic>
+      <p:sp>
+        <p:nvSpPr>
+          <p:cNvPr id="2" name="Title 1">
+            <a:extLst>
+              <a:ext uri="{FF2B5EF4-FFF2-40B4-BE49-F238E27FC236}">
+                <a16:creationId xmlns:a16="http://schemas.microsoft.com/office/drawing/2014/main" id="{D4496D4E-19E5-4D6C-B5C8-E532F1EB9514}"/>
+              </a:ext>
+            </a:extLst>
+          </p:cNvPr>
+          <p:cNvSpPr>
+            <a:spLocks noGrp="1"/>
+          </p:cNvSpPr>
+          <p:nvPr>
+            <p:ph type="title"/>
+          </p:nvPr>
+        </p:nvSpPr>
+        <p:spPr>
+          <a:xfrm>
+            <a:off x="685800" y="495300"/>
+            <a:ext cx="3771899" cy="666750"/>
+          </a:xfrm>
+        </p:spPr>
+        <p:txBody>
+          <a:bodyPr anchor="b">
+            <a:normAutofit/>
+          </a:bodyPr>
+          <a:lstStyle/>
+          <a:p>
+            <a:r>
+              <a:rPr lang="en-US" sz="2400" dirty="0"/>
+              <a:t>Output Example:</a:t>
+            </a:r>
+          </a:p>
+        </p:txBody>
+      </p:sp>
+      <p:sp>
+        <p:nvSpPr>
+          <p:cNvPr id="33" name="Content Placeholder 18">
+            <a:extLst>
+              <a:ext uri="{FF2B5EF4-FFF2-40B4-BE49-F238E27FC236}">
+                <a16:creationId xmlns:a16="http://schemas.microsoft.com/office/drawing/2014/main" id="{CB4AF501-EF7C-4C53-B129-9095E0B6A5EF}"/>
+              </a:ext>
+            </a:extLst>
+          </p:cNvPr>
+          <p:cNvSpPr>
+            <a:spLocks noGrp="1"/>
+          </p:cNvSpPr>
+          <p:nvPr>
+            <p:ph idx="1"/>
+          </p:nvPr>
+        </p:nvSpPr>
+        <p:spPr>
+          <a:xfrm>
+            <a:off x="685800" y="1397000"/>
+            <a:ext cx="3771899" cy="4889500"/>
+          </a:xfrm>
+        </p:spPr>
+        <p:txBody>
+          <a:bodyPr anchor="t">
+            <a:normAutofit/>
+          </a:bodyPr>
+          <a:lstStyle/>
+          <a:p>
+            <a:r>
+              <a:rPr lang="en-US" sz="1600" dirty="0"/>
+              <a:t>We’ve shot our first miss. It’s represented by a “0” on the board.</a:t>
+            </a:r>
+          </a:p>
+          <a:p>
+            <a:r>
+              <a:rPr lang="en-US" sz="1600" dirty="0"/>
+              <a:t>We can see that the number around the f7 shot dropped from an average of ~26 down to ~21.</a:t>
+            </a:r>
+          </a:p>
+          <a:p>
+            <a:r>
+              <a:rPr lang="en-US" sz="1600" dirty="0"/>
+              <a:t>The probability of squares that have already been targeted are irrelevant because ships can’t possibly be placed there. </a:t>
+            </a:r>
+          </a:p>
+          <a:p>
+            <a:r>
+              <a:rPr lang="en-US" sz="1600" dirty="0"/>
+              <a:t>Our next shot should probably be g5, because it’s the highest number on the board and is surround by high numbers as well. </a:t>
+            </a:r>
+          </a:p>
+          <a:p>
+            <a:r>
+              <a:rPr lang="en-US" sz="1600" dirty="0"/>
+              <a:t>g6 and e6 would also serve as decent targets.</a:t>
+            </a:r>
+          </a:p>
+        </p:txBody>
+      </p:sp>
+    </p:spTree>
+    <p:extLst>
+      <p:ext uri="{BB962C8B-B14F-4D97-AF65-F5344CB8AC3E}">
+        <p14:creationId xmlns:p14="http://schemas.microsoft.com/office/powerpoint/2010/main" val="739744245"/>
+      </p:ext>
+    </p:extLst>
+  </p:cSld>
+  <p:clrMapOvr>
+    <a:masterClrMapping/>
+  </p:clrMapOvr>
+</p:sld>
+</file>
+
+<file path=ppt/slides/slide11.xml><?xml version="1.0" encoding="utf-8"?>
+<p:sld xmlns:a="http://schemas.openxmlformats.org/drawingml/2006/main" xmlns:r="http://schemas.openxmlformats.org/officeDocument/2006/relationships" xmlns:p="http://schemas.openxmlformats.org/presentationml/2006/main">
+  <p:cSld>
+    <p:bg>
+      <p:bgPr>
+        <a:blipFill>
+          <a:blip r:embed="rId2"/>
+          <a:stretch/>
+        </a:blipFill>
+        <a:effectLst/>
+      </p:bgPr>
+    </p:bg>
+    <p:spTree>
+      <p:nvGrpSpPr>
+        <p:cNvPr id="1" name=""/>
+        <p:cNvGrpSpPr/>
+        <p:nvPr/>
+      </p:nvGrpSpPr>
+      <p:grpSpPr>
+        <a:xfrm>
+          <a:off x="0" y="0"/>
+          <a:ext cx="0" cy="0"/>
+          <a:chOff x="0" y="0"/>
+          <a:chExt cx="0" cy="0"/>
+        </a:xfrm>
+      </p:grpSpPr>
+      <p:pic>
+        <p:nvPicPr>
+          <p:cNvPr id="4" name="Picture 3">
+            <a:extLst>
+              <a:ext uri="{FF2B5EF4-FFF2-40B4-BE49-F238E27FC236}">
+                <a16:creationId xmlns:a16="http://schemas.microsoft.com/office/drawing/2014/main" id="{6A2FF95A-8F43-48EC-AB96-BC859915AFD5}"/>
+              </a:ext>
+            </a:extLst>
+          </p:cNvPr>
+          <p:cNvPicPr>
+            <a:picLocks noChangeAspect="1"/>
+          </p:cNvPicPr>
+          <p:nvPr/>
+        </p:nvPicPr>
+        <p:blipFill>
+          <a:blip r:embed="rId3"/>
+          <a:stretch>
+            <a:fillRect/>
+          </a:stretch>
+        </p:blipFill>
+        <p:spPr>
+          <a:xfrm>
+            <a:off x="5252627" y="0"/>
+            <a:ext cx="5303624" cy="6858000"/>
+          </a:xfrm>
+          <a:prstGeom prst="rect">
+            <a:avLst/>
+          </a:prstGeom>
+        </p:spPr>
+      </p:pic>
+      <p:sp>
+        <p:nvSpPr>
+          <p:cNvPr id="2" name="Title 1">
+            <a:extLst>
+              <a:ext uri="{FF2B5EF4-FFF2-40B4-BE49-F238E27FC236}">
+                <a16:creationId xmlns:a16="http://schemas.microsoft.com/office/drawing/2014/main" id="{D4496D4E-19E5-4D6C-B5C8-E532F1EB9514}"/>
+              </a:ext>
+            </a:extLst>
+          </p:cNvPr>
+          <p:cNvSpPr>
+            <a:spLocks noGrp="1"/>
+          </p:cNvSpPr>
+          <p:nvPr>
+            <p:ph type="title"/>
+          </p:nvPr>
+        </p:nvSpPr>
+        <p:spPr>
+          <a:xfrm>
+            <a:off x="685800" y="495300"/>
+            <a:ext cx="3771899" cy="666750"/>
+          </a:xfrm>
+        </p:spPr>
+        <p:txBody>
+          <a:bodyPr anchor="b">
+            <a:normAutofit/>
+          </a:bodyPr>
+          <a:lstStyle/>
+          <a:p>
+            <a:r>
+              <a:rPr lang="en-US" sz="2400" dirty="0"/>
+              <a:t>Output Example:</a:t>
+            </a:r>
+          </a:p>
+        </p:txBody>
+      </p:sp>
+      <p:sp>
+        <p:nvSpPr>
+          <p:cNvPr id="33" name="Content Placeholder 18">
+            <a:extLst>
+              <a:ext uri="{FF2B5EF4-FFF2-40B4-BE49-F238E27FC236}">
+                <a16:creationId xmlns:a16="http://schemas.microsoft.com/office/drawing/2014/main" id="{CB4AF501-EF7C-4C53-B129-9095E0B6A5EF}"/>
+              </a:ext>
+            </a:extLst>
+          </p:cNvPr>
+          <p:cNvSpPr>
+            <a:spLocks noGrp="1"/>
+          </p:cNvSpPr>
+          <p:nvPr>
+            <p:ph idx="1"/>
+          </p:nvPr>
+        </p:nvSpPr>
+        <p:spPr>
+          <a:xfrm>
+            <a:off x="685800" y="1397000"/>
+            <a:ext cx="3771899" cy="4889500"/>
+          </a:xfrm>
+        </p:spPr>
+        <p:txBody>
+          <a:bodyPr anchor="t">
+            <a:normAutofit/>
+          </a:bodyPr>
+          <a:lstStyle/>
+          <a:p>
+            <a:r>
+              <a:rPr lang="en-US" sz="1600" dirty="0"/>
+              <a:t>Another miss – that’s okay</a:t>
+            </a:r>
+          </a:p>
+          <a:p>
+            <a:r>
+              <a:rPr lang="en-US" sz="1600" dirty="0"/>
+              <a:t>Keep aiming towards the concentration of higher numbers until we score another hit.</a:t>
+            </a:r>
+          </a:p>
+          <a:p>
+            <a:r>
+              <a:rPr lang="en-US" sz="1600" dirty="0"/>
+              <a:t>Once a hit is scored; hunt it down until the ship gets sunk</a:t>
+            </a:r>
+          </a:p>
+          <a:p>
+            <a:pPr marL="0" indent="0">
+              <a:buNone/>
+            </a:pPr>
+            <a:endParaRPr lang="en-US" sz="1600" dirty="0"/>
+          </a:p>
+        </p:txBody>
+      </p:sp>
+    </p:spTree>
+    <p:extLst>
+      <p:ext uri="{BB962C8B-B14F-4D97-AF65-F5344CB8AC3E}">
+        <p14:creationId xmlns:p14="http://schemas.microsoft.com/office/powerpoint/2010/main" val="702667960"/>
+      </p:ext>
+    </p:extLst>
+  </p:cSld>
+  <p:clrMapOvr>
+    <a:masterClrMapping/>
+  </p:clrMapOvr>
+</p:sld>
+</file>
+
+<file path=ppt/slides/slide12.xml><?xml version="1.0" encoding="utf-8"?>
+<p:sld xmlns:a="http://schemas.openxmlformats.org/drawingml/2006/main" xmlns:r="http://schemas.openxmlformats.org/officeDocument/2006/relationships" xmlns:p="http://schemas.openxmlformats.org/presentationml/2006/main">
+  <p:cSld>
+    <p:bg>
+      <p:bgPr>
+        <a:blipFill>
+          <a:blip r:embed="rId2"/>
+          <a:stretch/>
+        </a:blipFill>
+        <a:effectLst/>
+      </p:bgPr>
+    </p:bg>
+    <p:spTree>
+      <p:nvGrpSpPr>
+        <p:cNvPr id="1" name=""/>
+        <p:cNvGrpSpPr/>
+        <p:nvPr/>
+      </p:nvGrpSpPr>
+      <p:grpSpPr>
+        <a:xfrm>
+          <a:off x="0" y="0"/>
+          <a:ext cx="0" cy="0"/>
+          <a:chOff x="0" y="0"/>
+          <a:chExt cx="0" cy="0"/>
+        </a:xfrm>
+      </p:grpSpPr>
+      <p:pic>
+        <p:nvPicPr>
+          <p:cNvPr id="3" name="Picture 2">
+            <a:extLst>
+              <a:ext uri="{FF2B5EF4-FFF2-40B4-BE49-F238E27FC236}">
+                <a16:creationId xmlns:a16="http://schemas.microsoft.com/office/drawing/2014/main" id="{F87EF9AC-7A2A-44A5-8931-D994DED5444D}"/>
+              </a:ext>
+            </a:extLst>
+          </p:cNvPr>
+          <p:cNvPicPr>
+            <a:picLocks noChangeAspect="1"/>
+          </p:cNvPicPr>
+          <p:nvPr/>
+        </p:nvPicPr>
+        <p:blipFill>
+          <a:blip r:embed="rId3"/>
+          <a:stretch>
+            <a:fillRect/>
+          </a:stretch>
+        </p:blipFill>
+        <p:spPr>
+          <a:xfrm>
+            <a:off x="5252627" y="0"/>
+            <a:ext cx="4933335" cy="6858000"/>
+          </a:xfrm>
+          <a:prstGeom prst="rect">
+            <a:avLst/>
+          </a:prstGeom>
+        </p:spPr>
+      </p:pic>
+      <p:sp>
+        <p:nvSpPr>
+          <p:cNvPr id="2" name="Title 1">
+            <a:extLst>
+              <a:ext uri="{FF2B5EF4-FFF2-40B4-BE49-F238E27FC236}">
+                <a16:creationId xmlns:a16="http://schemas.microsoft.com/office/drawing/2014/main" id="{D4496D4E-19E5-4D6C-B5C8-E532F1EB9514}"/>
+              </a:ext>
+            </a:extLst>
+          </p:cNvPr>
+          <p:cNvSpPr>
+            <a:spLocks noGrp="1"/>
+          </p:cNvSpPr>
+          <p:nvPr>
+            <p:ph type="title"/>
+          </p:nvPr>
+        </p:nvSpPr>
+        <p:spPr>
+          <a:xfrm>
+            <a:off x="685800" y="495300"/>
+            <a:ext cx="3771899" cy="666750"/>
+          </a:xfrm>
+        </p:spPr>
+        <p:txBody>
+          <a:bodyPr anchor="b">
+            <a:normAutofit/>
+          </a:bodyPr>
+          <a:lstStyle/>
+          <a:p>
+            <a:r>
+              <a:rPr lang="en-US" sz="2400" dirty="0"/>
+              <a:t>Output Example:</a:t>
+            </a:r>
+          </a:p>
+        </p:txBody>
+      </p:sp>
+      <p:sp>
+        <p:nvSpPr>
+          <p:cNvPr id="33" name="Content Placeholder 18">
+            <a:extLst>
+              <a:ext uri="{FF2B5EF4-FFF2-40B4-BE49-F238E27FC236}">
+                <a16:creationId xmlns:a16="http://schemas.microsoft.com/office/drawing/2014/main" id="{CB4AF501-EF7C-4C53-B129-9095E0B6A5EF}"/>
+              </a:ext>
+            </a:extLst>
+          </p:cNvPr>
+          <p:cNvSpPr>
+            <a:spLocks noGrp="1"/>
+          </p:cNvSpPr>
+          <p:nvPr>
+            <p:ph idx="1"/>
+          </p:nvPr>
+        </p:nvSpPr>
+        <p:spPr>
+          <a:xfrm>
+            <a:off x="685800" y="1397000"/>
+            <a:ext cx="3771899" cy="4889500"/>
+          </a:xfrm>
+        </p:spPr>
+        <p:txBody>
+          <a:bodyPr anchor="t">
+            <a:normAutofit/>
+          </a:bodyPr>
+          <a:lstStyle/>
+          <a:p>
+            <a:r>
+              <a:rPr lang="en-US" sz="1600" dirty="0"/>
+              <a:t>We’ve skipped ahead; three of the five ships have been sunk. We’re looking for the patrol boat (length 2) and the battleship (length 4).</a:t>
+            </a:r>
+          </a:p>
+          <a:p>
+            <a:r>
+              <a:rPr lang="en-US" sz="1600" dirty="0"/>
+              <a:t>We’ve got a lot of open water that could be hiding these two remaining ships; but the probability board gives us a pretty good idea of where to start. </a:t>
+            </a:r>
+          </a:p>
+          <a:p>
+            <a:pPr marL="0" indent="0">
+              <a:buNone/>
+            </a:pPr>
+            <a:endParaRPr lang="en-US" sz="1600" dirty="0"/>
+          </a:p>
+        </p:txBody>
+      </p:sp>
+    </p:spTree>
+    <p:extLst>
+      <p:ext uri="{BB962C8B-B14F-4D97-AF65-F5344CB8AC3E}">
+        <p14:creationId xmlns:p14="http://schemas.microsoft.com/office/powerpoint/2010/main" val="29754534"/>
+      </p:ext>
+    </p:extLst>
+  </p:cSld>
+  <p:clrMapOvr>
+    <a:masterClrMapping/>
+  </p:clrMapOvr>
+</p:sld>
+</file>
+
+<file path=ppt/slides/slide13.xml><?xml version="1.0" encoding="utf-8"?>
+<p:sld xmlns:a="http://schemas.openxmlformats.org/drawingml/2006/main" xmlns:r="http://schemas.openxmlformats.org/officeDocument/2006/relationships" xmlns:p="http://schemas.openxmlformats.org/presentationml/2006/main">
+  <p:cSld>
+    <p:bg>
+      <p:bgPr>
+        <a:blipFill>
+          <a:blip r:embed="rId2"/>
+          <a:stretch/>
+        </a:blipFill>
+        <a:effectLst/>
+      </p:bgPr>
+    </p:bg>
+    <p:spTree>
+      <p:nvGrpSpPr>
+        <p:cNvPr id="1" name=""/>
+        <p:cNvGrpSpPr/>
+        <p:nvPr/>
+      </p:nvGrpSpPr>
+      <p:grpSpPr>
+        <a:xfrm>
+          <a:off x="0" y="0"/>
+          <a:ext cx="0" cy="0"/>
+          <a:chOff x="0" y="0"/>
+          <a:chExt cx="0" cy="0"/>
+        </a:xfrm>
+      </p:grpSpPr>
+      <p:pic>
+        <p:nvPicPr>
+          <p:cNvPr id="4" name="Picture 3">
+            <a:extLst>
+              <a:ext uri="{FF2B5EF4-FFF2-40B4-BE49-F238E27FC236}">
+                <a16:creationId xmlns:a16="http://schemas.microsoft.com/office/drawing/2014/main" id="{B39D454F-35BE-4BEF-8982-AB6F34CA55E1}"/>
+              </a:ext>
+            </a:extLst>
+          </p:cNvPr>
+          <p:cNvPicPr>
+            <a:picLocks noChangeAspect="1"/>
+          </p:cNvPicPr>
+          <p:nvPr/>
+        </p:nvPicPr>
+        <p:blipFill>
+          <a:blip r:embed="rId3"/>
+          <a:stretch>
+            <a:fillRect/>
+          </a:stretch>
+        </p:blipFill>
+        <p:spPr>
+          <a:xfrm>
+            <a:off x="5252627" y="0"/>
+            <a:ext cx="5291570" cy="6858000"/>
+          </a:xfrm>
+          <a:prstGeom prst="rect">
+            <a:avLst/>
+          </a:prstGeom>
+        </p:spPr>
+      </p:pic>
+      <p:sp>
+        <p:nvSpPr>
+          <p:cNvPr id="2" name="Title 1">
+            <a:extLst>
+              <a:ext uri="{FF2B5EF4-FFF2-40B4-BE49-F238E27FC236}">
+                <a16:creationId xmlns:a16="http://schemas.microsoft.com/office/drawing/2014/main" id="{D4496D4E-19E5-4D6C-B5C8-E532F1EB9514}"/>
+              </a:ext>
+            </a:extLst>
+          </p:cNvPr>
+          <p:cNvSpPr>
+            <a:spLocks noGrp="1"/>
+          </p:cNvSpPr>
+          <p:nvPr>
+            <p:ph type="title"/>
+          </p:nvPr>
+        </p:nvSpPr>
+        <p:spPr>
+          <a:xfrm>
+            <a:off x="685800" y="495300"/>
+            <a:ext cx="3771899" cy="666750"/>
+          </a:xfrm>
+        </p:spPr>
+        <p:txBody>
+          <a:bodyPr anchor="b">
+            <a:normAutofit/>
+          </a:bodyPr>
+          <a:lstStyle/>
+          <a:p>
+            <a:r>
+              <a:rPr lang="en-US" sz="2400" dirty="0"/>
+              <a:t>Output Example:</a:t>
+            </a:r>
+          </a:p>
+        </p:txBody>
+      </p:sp>
+      <p:sp>
+        <p:nvSpPr>
+          <p:cNvPr id="33" name="Content Placeholder 18">
+            <a:extLst>
+              <a:ext uri="{FF2B5EF4-FFF2-40B4-BE49-F238E27FC236}">
+                <a16:creationId xmlns:a16="http://schemas.microsoft.com/office/drawing/2014/main" id="{CB4AF501-EF7C-4C53-B129-9095E0B6A5EF}"/>
+              </a:ext>
+            </a:extLst>
+          </p:cNvPr>
+          <p:cNvSpPr>
+            <a:spLocks noGrp="1"/>
+          </p:cNvSpPr>
+          <p:nvPr>
+            <p:ph idx="1"/>
+          </p:nvPr>
+        </p:nvSpPr>
+        <p:spPr>
+          <a:xfrm>
+            <a:off x="685800" y="1397000"/>
+            <a:ext cx="3771899" cy="4889500"/>
+          </a:xfrm>
+        </p:spPr>
+        <p:txBody>
+          <a:bodyPr anchor="t">
+            <a:normAutofit/>
+          </a:bodyPr>
+          <a:lstStyle/>
+          <a:p>
+            <a:r>
+              <a:rPr lang="en-US" sz="1600" dirty="0"/>
+              <a:t>We’ve scored a hit; lets finish it off and start looking for the last ship.</a:t>
+            </a:r>
+          </a:p>
+          <a:p>
+            <a:pPr marL="0" indent="0">
+              <a:buNone/>
+            </a:pPr>
+            <a:endParaRPr lang="en-US" sz="1600" dirty="0"/>
+          </a:p>
+        </p:txBody>
+      </p:sp>
+    </p:spTree>
+    <p:extLst>
+      <p:ext uri="{BB962C8B-B14F-4D97-AF65-F5344CB8AC3E}">
+        <p14:creationId xmlns:p14="http://schemas.microsoft.com/office/powerpoint/2010/main" val="3519614751"/>
+      </p:ext>
+    </p:extLst>
+  </p:cSld>
+  <p:clrMapOvr>
+    <a:masterClrMapping/>
+  </p:clrMapOvr>
+</p:sld>
+</file>
+
+<file path=ppt/slides/slide14.xml><?xml version="1.0" encoding="utf-8"?>
+<p:sld xmlns:a="http://schemas.openxmlformats.org/drawingml/2006/main" xmlns:r="http://schemas.openxmlformats.org/officeDocument/2006/relationships" xmlns:p="http://schemas.openxmlformats.org/presentationml/2006/main">
+  <p:cSld>
+    <p:bg>
+      <p:bgPr>
+        <a:blipFill>
+          <a:blip r:embed="rId2"/>
+          <a:stretch/>
+        </a:blipFill>
+        <a:effectLst/>
+      </p:bgPr>
+    </p:bg>
+    <p:spTree>
+      <p:nvGrpSpPr>
+        <p:cNvPr id="1" name=""/>
+        <p:cNvGrpSpPr/>
+        <p:nvPr/>
+      </p:nvGrpSpPr>
+      <p:grpSpPr>
+        <a:xfrm>
+          <a:off x="0" y="0"/>
+          <a:ext cx="0" cy="0"/>
+          <a:chOff x="0" y="0"/>
+          <a:chExt cx="0" cy="0"/>
+        </a:xfrm>
+      </p:grpSpPr>
+      <p:pic>
+        <p:nvPicPr>
+          <p:cNvPr id="3" name="Picture 2">
+            <a:extLst>
+              <a:ext uri="{FF2B5EF4-FFF2-40B4-BE49-F238E27FC236}">
+                <a16:creationId xmlns:a16="http://schemas.microsoft.com/office/drawing/2014/main" id="{F300D382-8FF9-4684-9286-8CEED0898F33}"/>
+              </a:ext>
+            </a:extLst>
+          </p:cNvPr>
+          <p:cNvPicPr>
+            <a:picLocks noChangeAspect="1"/>
+          </p:cNvPicPr>
+          <p:nvPr/>
+        </p:nvPicPr>
+        <p:blipFill>
+          <a:blip r:embed="rId3"/>
+          <a:stretch>
+            <a:fillRect/>
+          </a:stretch>
+        </p:blipFill>
+        <p:spPr>
+          <a:xfrm>
+            <a:off x="5252627" y="0"/>
+            <a:ext cx="4876002" cy="6858000"/>
+          </a:xfrm>
+          <a:prstGeom prst="rect">
+            <a:avLst/>
+          </a:prstGeom>
+        </p:spPr>
+      </p:pic>
+      <p:sp>
+        <p:nvSpPr>
+          <p:cNvPr id="2" name="Title 1">
+            <a:extLst>
+              <a:ext uri="{FF2B5EF4-FFF2-40B4-BE49-F238E27FC236}">
+                <a16:creationId xmlns:a16="http://schemas.microsoft.com/office/drawing/2014/main" id="{D4496D4E-19E5-4D6C-B5C8-E532F1EB9514}"/>
+              </a:ext>
+            </a:extLst>
+          </p:cNvPr>
+          <p:cNvSpPr>
+            <a:spLocks noGrp="1"/>
+          </p:cNvSpPr>
+          <p:nvPr>
+            <p:ph type="title"/>
+          </p:nvPr>
+        </p:nvSpPr>
+        <p:spPr>
+          <a:xfrm>
+            <a:off x="685800" y="495300"/>
+            <a:ext cx="3771899" cy="666750"/>
+          </a:xfrm>
+        </p:spPr>
+        <p:txBody>
+          <a:bodyPr anchor="b">
+            <a:normAutofit/>
+          </a:bodyPr>
+          <a:lstStyle/>
+          <a:p>
+            <a:r>
+              <a:rPr lang="en-US" sz="2400" dirty="0"/>
+              <a:t>Output Example:</a:t>
+            </a:r>
+          </a:p>
+        </p:txBody>
+      </p:sp>
+      <p:sp>
+        <p:nvSpPr>
+          <p:cNvPr id="33" name="Content Placeholder 18">
+            <a:extLst>
+              <a:ext uri="{FF2B5EF4-FFF2-40B4-BE49-F238E27FC236}">
+                <a16:creationId xmlns:a16="http://schemas.microsoft.com/office/drawing/2014/main" id="{CB4AF501-EF7C-4C53-B129-9095E0B6A5EF}"/>
+              </a:ext>
+            </a:extLst>
+          </p:cNvPr>
+          <p:cNvSpPr>
+            <a:spLocks noGrp="1"/>
+          </p:cNvSpPr>
+          <p:nvPr>
+            <p:ph idx="1"/>
+          </p:nvPr>
+        </p:nvSpPr>
+        <p:spPr>
+          <a:xfrm>
+            <a:off x="685800" y="1397000"/>
+            <a:ext cx="3771899" cy="4889500"/>
+          </a:xfrm>
+        </p:spPr>
+        <p:txBody>
+          <a:bodyPr anchor="t">
+            <a:normAutofit/>
+          </a:bodyPr>
+          <a:lstStyle/>
+          <a:p>
+            <a:r>
+              <a:rPr lang="en-US" sz="1600" dirty="0"/>
+              <a:t>We’ve sunk the patrol boat! This is good news because it severely reduces the possible locations for the last possible ship to be. </a:t>
+            </a:r>
+          </a:p>
+          <a:p>
+            <a:pPr marL="0" indent="0">
+              <a:buNone/>
+            </a:pPr>
+            <a:endParaRPr lang="en-US" sz="1600" dirty="0"/>
+          </a:p>
+        </p:txBody>
+      </p:sp>
+    </p:spTree>
+    <p:extLst>
+      <p:ext uri="{BB962C8B-B14F-4D97-AF65-F5344CB8AC3E}">
+        <p14:creationId xmlns:p14="http://schemas.microsoft.com/office/powerpoint/2010/main" val="384928258"/>
+      </p:ext>
+    </p:extLst>
+  </p:cSld>
+  <p:clrMapOvr>
+    <a:masterClrMapping/>
+  </p:clrMapOvr>
+</p:sld>
+</file>
+
+<file path=ppt/slides/slide15.xml><?xml version="1.0" encoding="utf-8"?>
+<p:sld xmlns:a="http://schemas.openxmlformats.org/drawingml/2006/main" xmlns:r="http://schemas.openxmlformats.org/officeDocument/2006/relationships" xmlns:p="http://schemas.openxmlformats.org/presentationml/2006/main">
+  <p:cSld>
+    <p:bg>
+      <p:bgPr>
+        <a:blipFill>
+          <a:blip r:embed="rId2"/>
+          <a:stretch/>
+        </a:blipFill>
+        <a:effectLst/>
+      </p:bgPr>
+    </p:bg>
+    <p:spTree>
+      <p:nvGrpSpPr>
+        <p:cNvPr id="1" name=""/>
+        <p:cNvGrpSpPr/>
+        <p:nvPr/>
+      </p:nvGrpSpPr>
+      <p:grpSpPr>
+        <a:xfrm>
+          <a:off x="0" y="0"/>
+          <a:ext cx="0" cy="0"/>
+          <a:chOff x="0" y="0"/>
+          <a:chExt cx="0" cy="0"/>
+        </a:xfrm>
+      </p:grpSpPr>
+      <p:pic>
+        <p:nvPicPr>
+          <p:cNvPr id="4" name="Picture 3">
+            <a:extLst>
+              <a:ext uri="{FF2B5EF4-FFF2-40B4-BE49-F238E27FC236}">
+                <a16:creationId xmlns:a16="http://schemas.microsoft.com/office/drawing/2014/main" id="{4BEF8C6A-943E-405C-9282-32E73E0BA4AF}"/>
+              </a:ext>
+            </a:extLst>
+          </p:cNvPr>
+          <p:cNvPicPr>
+            <a:picLocks noChangeAspect="1"/>
+          </p:cNvPicPr>
+          <p:nvPr/>
+        </p:nvPicPr>
+        <p:blipFill>
+          <a:blip r:embed="rId3"/>
+          <a:stretch>
+            <a:fillRect/>
+          </a:stretch>
+        </p:blipFill>
+        <p:spPr>
+          <a:xfrm>
+            <a:off x="5252627" y="0"/>
+            <a:ext cx="4845170" cy="6858000"/>
+          </a:xfrm>
+          <a:prstGeom prst="rect">
+            <a:avLst/>
+          </a:prstGeom>
+        </p:spPr>
+      </p:pic>
+      <p:sp>
+        <p:nvSpPr>
+          <p:cNvPr id="2" name="Title 1">
+            <a:extLst>
+              <a:ext uri="{FF2B5EF4-FFF2-40B4-BE49-F238E27FC236}">
+                <a16:creationId xmlns:a16="http://schemas.microsoft.com/office/drawing/2014/main" id="{D4496D4E-19E5-4D6C-B5C8-E532F1EB9514}"/>
+              </a:ext>
+            </a:extLst>
+          </p:cNvPr>
+          <p:cNvSpPr>
+            <a:spLocks noGrp="1"/>
+          </p:cNvSpPr>
+          <p:nvPr>
+            <p:ph type="title"/>
+          </p:nvPr>
+        </p:nvSpPr>
+        <p:spPr>
+          <a:xfrm>
+            <a:off x="685800" y="495300"/>
+            <a:ext cx="3771899" cy="666750"/>
+          </a:xfrm>
+        </p:spPr>
+        <p:txBody>
+          <a:bodyPr anchor="b">
+            <a:normAutofit/>
+          </a:bodyPr>
+          <a:lstStyle/>
+          <a:p>
+            <a:r>
+              <a:rPr lang="en-US" sz="2400" dirty="0"/>
+              <a:t>Output Example:</a:t>
+            </a:r>
+          </a:p>
+        </p:txBody>
+      </p:sp>
+      <p:sp>
+        <p:nvSpPr>
+          <p:cNvPr id="33" name="Content Placeholder 18">
+            <a:extLst>
+              <a:ext uri="{FF2B5EF4-FFF2-40B4-BE49-F238E27FC236}">
+                <a16:creationId xmlns:a16="http://schemas.microsoft.com/office/drawing/2014/main" id="{CB4AF501-EF7C-4C53-B129-9095E0B6A5EF}"/>
+              </a:ext>
+            </a:extLst>
+          </p:cNvPr>
+          <p:cNvSpPr>
+            <a:spLocks noGrp="1"/>
+          </p:cNvSpPr>
+          <p:nvPr>
+            <p:ph idx="1"/>
+          </p:nvPr>
+        </p:nvSpPr>
+        <p:spPr>
+          <a:xfrm>
+            <a:off x="685800" y="1397000"/>
+            <a:ext cx="3771899" cy="4889500"/>
+          </a:xfrm>
+        </p:spPr>
+        <p:txBody>
+          <a:bodyPr anchor="t">
+            <a:normAutofit/>
+          </a:bodyPr>
+          <a:lstStyle/>
+          <a:p>
+            <a:r>
+              <a:rPr lang="en-US" sz="1600" dirty="0"/>
+              <a:t>We’ve scored a hit on the last ship. </a:t>
+            </a:r>
+          </a:p>
+          <a:p>
+            <a:r>
+              <a:rPr lang="en-US" sz="1600" dirty="0"/>
+              <a:t>Let's finish it off and get our final score.</a:t>
+            </a:r>
+          </a:p>
+          <a:p>
+            <a:pPr marL="0" indent="0">
+              <a:buNone/>
+            </a:pPr>
+            <a:endParaRPr lang="en-US" sz="1600" dirty="0"/>
+          </a:p>
+        </p:txBody>
+      </p:sp>
+    </p:spTree>
+    <p:extLst>
+      <p:ext uri="{BB962C8B-B14F-4D97-AF65-F5344CB8AC3E}">
+        <p14:creationId xmlns:p14="http://schemas.microsoft.com/office/powerpoint/2010/main" val="3491886187"/>
+      </p:ext>
+    </p:extLst>
+  </p:cSld>
+  <p:clrMapOvr>
+    <a:masterClrMapping/>
+  </p:clrMapOvr>
+</p:sld>
+</file>
+
+<file path=ppt/slides/slide16.xml><?xml version="1.0" encoding="utf-8"?>
+<p:sld xmlns:a="http://schemas.openxmlformats.org/drawingml/2006/main" xmlns:r="http://schemas.openxmlformats.org/officeDocument/2006/relationships" xmlns:p="http://schemas.openxmlformats.org/presentationml/2006/main">
+  <p:cSld>
+    <p:bg>
+      <p:bgPr>
+        <a:blipFill>
+          <a:blip r:embed="rId2"/>
+          <a:stretch/>
+        </a:blipFill>
+        <a:effectLst/>
+      </p:bgPr>
+    </p:bg>
+    <p:spTree>
+      <p:nvGrpSpPr>
+        <p:cNvPr id="1" name=""/>
+        <p:cNvGrpSpPr/>
+        <p:nvPr/>
+      </p:nvGrpSpPr>
+      <p:grpSpPr>
+        <a:xfrm>
+          <a:off x="0" y="0"/>
+          <a:ext cx="0" cy="0"/>
+          <a:chOff x="0" y="0"/>
+          <a:chExt cx="0" cy="0"/>
+        </a:xfrm>
+      </p:grpSpPr>
+      <p:sp>
+        <p:nvSpPr>
+          <p:cNvPr id="2" name="Title 1">
+            <a:extLst>
+              <a:ext uri="{FF2B5EF4-FFF2-40B4-BE49-F238E27FC236}">
+                <a16:creationId xmlns:a16="http://schemas.microsoft.com/office/drawing/2014/main" id="{D4496D4E-19E5-4D6C-B5C8-E532F1EB9514}"/>
+              </a:ext>
+            </a:extLst>
+          </p:cNvPr>
+          <p:cNvSpPr>
+            <a:spLocks noGrp="1"/>
+          </p:cNvSpPr>
+          <p:nvPr>
+            <p:ph type="title"/>
+          </p:nvPr>
+        </p:nvSpPr>
+        <p:spPr>
+          <a:xfrm>
+            <a:off x="685800" y="495300"/>
+            <a:ext cx="3771899" cy="666750"/>
+          </a:xfrm>
+        </p:spPr>
+        <p:txBody>
+          <a:bodyPr anchor="b">
+            <a:normAutofit/>
+          </a:bodyPr>
+          <a:lstStyle/>
+          <a:p>
+            <a:r>
+              <a:rPr lang="en-US" sz="2400" dirty="0"/>
+              <a:t>Output Example:</a:t>
+            </a:r>
+          </a:p>
+        </p:txBody>
+      </p:sp>
+      <p:sp>
+        <p:nvSpPr>
+          <p:cNvPr id="33" name="Content Placeholder 18">
+            <a:extLst>
+              <a:ext uri="{FF2B5EF4-FFF2-40B4-BE49-F238E27FC236}">
+                <a16:creationId xmlns:a16="http://schemas.microsoft.com/office/drawing/2014/main" id="{CB4AF501-EF7C-4C53-B129-9095E0B6A5EF}"/>
+              </a:ext>
+            </a:extLst>
+          </p:cNvPr>
+          <p:cNvSpPr>
+            <a:spLocks noGrp="1"/>
+          </p:cNvSpPr>
+          <p:nvPr>
+            <p:ph idx="1"/>
+          </p:nvPr>
+        </p:nvSpPr>
+        <p:spPr>
+          <a:xfrm>
+            <a:off x="685800" y="1397000"/>
+            <a:ext cx="3771899" cy="4889500"/>
+          </a:xfrm>
+        </p:spPr>
+        <p:txBody>
+          <a:bodyPr anchor="t">
+            <a:normAutofit/>
+          </a:bodyPr>
+          <a:lstStyle/>
+          <a:p>
+            <a:r>
+              <a:rPr lang="en-US" sz="1600" dirty="0"/>
+              <a:t>Congratulations!</a:t>
+            </a:r>
+          </a:p>
+          <a:p>
+            <a:r>
+              <a:rPr lang="en-US" sz="1600" dirty="0"/>
+              <a:t>We’ve sunk all the ships!</a:t>
+            </a:r>
+          </a:p>
+          <a:p>
+            <a:r>
+              <a:rPr lang="en-US" sz="1600" dirty="0"/>
+              <a:t>It only took us 27 shots!</a:t>
+            </a:r>
+          </a:p>
+          <a:p>
+            <a:pPr marL="0" indent="0">
+              <a:buNone/>
+            </a:pPr>
+            <a:endParaRPr lang="en-US" sz="1600" dirty="0"/>
+          </a:p>
+        </p:txBody>
+      </p:sp>
+      <p:pic>
+        <p:nvPicPr>
+          <p:cNvPr id="3" name="Picture 2">
+            <a:extLst>
+              <a:ext uri="{FF2B5EF4-FFF2-40B4-BE49-F238E27FC236}">
+                <a16:creationId xmlns:a16="http://schemas.microsoft.com/office/drawing/2014/main" id="{3B02165A-7293-435D-820C-2FC473EECD93}"/>
+              </a:ext>
+            </a:extLst>
+          </p:cNvPr>
+          <p:cNvPicPr>
+            <a:picLocks noChangeAspect="1"/>
+          </p:cNvPicPr>
+          <p:nvPr/>
+        </p:nvPicPr>
+        <p:blipFill>
+          <a:blip r:embed="rId3"/>
+          <a:stretch>
+            <a:fillRect/>
+          </a:stretch>
+        </p:blipFill>
+        <p:spPr>
+          <a:xfrm>
+            <a:off x="5570127" y="959272"/>
+            <a:ext cx="4894673" cy="4939456"/>
+          </a:xfrm>
+          <a:prstGeom prst="rect">
+            <a:avLst/>
+          </a:prstGeom>
+        </p:spPr>
+      </p:pic>
+    </p:spTree>
+    <p:extLst>
+      <p:ext uri="{BB962C8B-B14F-4D97-AF65-F5344CB8AC3E}">
+        <p14:creationId xmlns:p14="http://schemas.microsoft.com/office/powerpoint/2010/main" val="2720916979"/>
+      </p:ext>
+    </p:extLst>
+  </p:cSld>
+  <p:clrMapOvr>
+    <a:masterClrMapping/>
+  </p:clrMapOvr>
+</p:sld>
+</file>
+
+<file path=ppt/slides/slide17.xml><?xml version="1.0" encoding="utf-8"?>
+<p:sld xmlns:a="http://schemas.openxmlformats.org/drawingml/2006/main" xmlns:r="http://schemas.openxmlformats.org/officeDocument/2006/relationships" xmlns:p="http://schemas.openxmlformats.org/presentationml/2006/main">
+  <p:cSld>
+    <p:spTree>
+      <p:nvGrpSpPr>
+        <p:cNvPr id="1" name=""/>
+        <p:cNvGrpSpPr/>
+        <p:nvPr/>
+      </p:nvGrpSpPr>
+      <p:grpSpPr>
+        <a:xfrm>
+          <a:off x="0" y="0"/>
+          <a:ext cx="0" cy="0"/>
+          <a:chOff x="0" y="0"/>
+          <a:chExt cx="0" cy="0"/>
+        </a:xfrm>
+      </p:grpSpPr>
+      <p:sp>
+        <p:nvSpPr>
+          <p:cNvPr id="2" name="Title 1">
+            <a:extLst>
+              <a:ext uri="{FF2B5EF4-FFF2-40B4-BE49-F238E27FC236}">
+                <a16:creationId xmlns:a16="http://schemas.microsoft.com/office/drawing/2014/main" id="{D4496D4E-19E5-4D6C-B5C8-E532F1EB9514}"/>
+              </a:ext>
+            </a:extLst>
+          </p:cNvPr>
+          <p:cNvSpPr>
+            <a:spLocks noGrp="1"/>
+          </p:cNvSpPr>
+          <p:nvPr>
+            <p:ph type="title"/>
+          </p:nvPr>
+        </p:nvSpPr>
+        <p:spPr>
+          <a:xfrm>
+            <a:off x="234539" y="152400"/>
+            <a:ext cx="10131425" cy="1456267"/>
+          </a:xfrm>
+        </p:spPr>
+        <p:txBody>
+          <a:bodyPr/>
+          <a:lstStyle/>
+          <a:p>
+            <a:r>
+              <a:rPr lang="en-US" dirty="0"/>
+              <a:t>Inspiration and works cited</a:t>
+            </a:r>
+          </a:p>
+        </p:txBody>
+      </p:sp>
+      <p:sp>
+        <p:nvSpPr>
+          <p:cNvPr id="3" name="Content Placeholder 2">
+            <a:extLst>
+              <a:ext uri="{FF2B5EF4-FFF2-40B4-BE49-F238E27FC236}">
+                <a16:creationId xmlns:a16="http://schemas.microsoft.com/office/drawing/2014/main" id="{8BB9D22C-39B4-43B2-8821-12AD2D134024}"/>
+              </a:ext>
+            </a:extLst>
+          </p:cNvPr>
+          <p:cNvSpPr>
+            <a:spLocks noGrp="1"/>
+          </p:cNvSpPr>
+          <p:nvPr>
+            <p:ph idx="1"/>
+          </p:nvPr>
+        </p:nvSpPr>
+        <p:spPr>
+          <a:xfrm>
+            <a:off x="234539" y="1419102"/>
+            <a:ext cx="10131425" cy="5286498"/>
+          </a:xfrm>
+        </p:spPr>
+        <p:txBody>
+          <a:bodyPr>
+            <a:normAutofit/>
+          </a:bodyPr>
+          <a:lstStyle/>
+          <a:p>
+            <a:pPr marL="0" indent="0">
+              <a:buNone/>
+            </a:pPr>
+            <a:r>
+              <a:rPr lang="en-US" dirty="0"/>
+              <a:t>The main inspiration for this project came from Cheston’s stupid competitive nature and wanting to let computers make smart decisions for him. (He’s really bad at making smart decisions.) After getting beat by his nephew over Christmas break in a game of battleship he’d had enough. </a:t>
+            </a:r>
+          </a:p>
+          <a:p>
+            <a:pPr marL="0" indent="0">
+              <a:buNone/>
+            </a:pPr>
+            <a:endParaRPr lang="en-US" dirty="0"/>
+          </a:p>
+          <a:p>
+            <a:pPr marL="0" indent="0">
+              <a:buNone/>
+            </a:pPr>
+            <a:r>
+              <a:rPr lang="en-US" dirty="0"/>
+              <a:t>The statistics, math, and images used in this presentation came from </a:t>
+            </a:r>
+            <a:r>
+              <a:rPr lang="en-US" dirty="0">
+                <a:hlinkClick r:id="rId2"/>
+              </a:rPr>
+              <a:t>http://www.datagenetics.com/blog.html</a:t>
+            </a:r>
+            <a:r>
+              <a:rPr lang="en-US" dirty="0"/>
+              <a:t>. It’s a really cool site that explains statistical odds, probabilities, and algorithms for a variety of problems. We simply adapted them to run in parallel. </a:t>
+            </a:r>
+          </a:p>
+          <a:p>
+            <a:pPr marL="0" indent="0">
+              <a:buNone/>
+            </a:pPr>
+            <a:endParaRPr lang="en-US" dirty="0"/>
+          </a:p>
+          <a:p>
+            <a:pPr marL="0" indent="0">
+              <a:buNone/>
+            </a:pPr>
+            <a:r>
+              <a:rPr lang="en-US" dirty="0"/>
+              <a:t>The actual page that talks about Battleship is:</a:t>
+            </a:r>
+          </a:p>
+          <a:p>
+            <a:pPr marL="0" indent="0">
+              <a:buNone/>
+            </a:pPr>
+            <a:r>
+              <a:rPr lang="en-US" dirty="0">
+                <a:hlinkClick r:id="rId3"/>
+              </a:rPr>
+              <a:t>http://www.datagenetics.com/blog/december32011/index.html</a:t>
+            </a:r>
+            <a:endParaRPr lang="en-US" dirty="0"/>
+          </a:p>
+        </p:txBody>
+      </p:sp>
+    </p:spTree>
+    <p:extLst>
+      <p:ext uri="{BB962C8B-B14F-4D97-AF65-F5344CB8AC3E}">
+        <p14:creationId xmlns:p14="http://schemas.microsoft.com/office/powerpoint/2010/main" val="2234857803"/>
+      </p:ext>
+    </p:extLst>
+  </p:cSld>
+  <p:clrMapOvr>
+    <a:masterClrMapping/>
+  </p:clrMapOvr>
+</p:sld>
+</file>
+
 <file path=ppt/slides/slide2.xml><?xml version="1.0" encoding="utf-8"?>
 <p:sld xmlns:a="http://schemas.openxmlformats.org/drawingml/2006/main" xmlns:r="http://schemas.openxmlformats.org/officeDocument/2006/relationships" xmlns:p="http://schemas.openxmlformats.org/presentationml/2006/main">
   <p:cSld>
@@ -7491,6 +8729,459 @@
     <p:extLst>
       <p:ext uri="{BB962C8B-B14F-4D97-AF65-F5344CB8AC3E}">
         <p14:creationId xmlns:p14="http://schemas.microsoft.com/office/powerpoint/2010/main" val="2425309080"/>
+      </p:ext>
+    </p:extLst>
+  </p:cSld>
+  <p:clrMapOvr>
+    <a:masterClrMapping/>
+  </p:clrMapOvr>
+</p:sld>
+</file>
+
+<file path=ppt/slides/slide7.xml><?xml version="1.0" encoding="utf-8"?>
+<p:sld xmlns:a="http://schemas.openxmlformats.org/drawingml/2006/main" xmlns:r="http://schemas.openxmlformats.org/officeDocument/2006/relationships" xmlns:p="http://schemas.openxmlformats.org/presentationml/2006/main">
+  <p:cSld>
+    <p:bg>
+      <p:bgPr>
+        <a:blipFill>
+          <a:blip r:embed="rId2"/>
+          <a:stretch/>
+        </a:blipFill>
+        <a:effectLst/>
+      </p:bgPr>
+    </p:bg>
+    <p:spTree>
+      <p:nvGrpSpPr>
+        <p:cNvPr id="1" name=""/>
+        <p:cNvGrpSpPr/>
+        <p:nvPr/>
+      </p:nvGrpSpPr>
+      <p:grpSpPr>
+        <a:xfrm>
+          <a:off x="0" y="0"/>
+          <a:ext cx="0" cy="0"/>
+          <a:chOff x="0" y="0"/>
+          <a:chExt cx="0" cy="0"/>
+        </a:xfrm>
+      </p:grpSpPr>
+      <p:sp>
+        <p:nvSpPr>
+          <p:cNvPr id="2" name="Title 1">
+            <a:extLst>
+              <a:ext uri="{FF2B5EF4-FFF2-40B4-BE49-F238E27FC236}">
+                <a16:creationId xmlns:a16="http://schemas.microsoft.com/office/drawing/2014/main" id="{D4496D4E-19E5-4D6C-B5C8-E532F1EB9514}"/>
+              </a:ext>
+            </a:extLst>
+          </p:cNvPr>
+          <p:cNvSpPr>
+            <a:spLocks noGrp="1"/>
+          </p:cNvSpPr>
+          <p:nvPr>
+            <p:ph type="title"/>
+          </p:nvPr>
+        </p:nvSpPr>
+        <p:spPr>
+          <a:xfrm>
+            <a:off x="685800" y="495300"/>
+            <a:ext cx="3771899" cy="666750"/>
+          </a:xfrm>
+        </p:spPr>
+        <p:txBody>
+          <a:bodyPr anchor="b">
+            <a:normAutofit/>
+          </a:bodyPr>
+          <a:lstStyle/>
+          <a:p>
+            <a:r>
+              <a:rPr lang="en-US" sz="2400" dirty="0"/>
+              <a:t>Output Example:</a:t>
+            </a:r>
+          </a:p>
+        </p:txBody>
+      </p:sp>
+      <p:sp>
+        <p:nvSpPr>
+          <p:cNvPr id="33" name="Content Placeholder 18">
+            <a:extLst>
+              <a:ext uri="{FF2B5EF4-FFF2-40B4-BE49-F238E27FC236}">
+                <a16:creationId xmlns:a16="http://schemas.microsoft.com/office/drawing/2014/main" id="{CB4AF501-EF7C-4C53-B129-9095E0B6A5EF}"/>
+              </a:ext>
+            </a:extLst>
+          </p:cNvPr>
+          <p:cNvSpPr>
+            <a:spLocks noGrp="1"/>
+          </p:cNvSpPr>
+          <p:nvPr>
+            <p:ph idx="1"/>
+          </p:nvPr>
+        </p:nvSpPr>
+        <p:spPr>
+          <a:xfrm>
+            <a:off x="685800" y="1397000"/>
+            <a:ext cx="3771899" cy="4737100"/>
+          </a:xfrm>
+        </p:spPr>
+        <p:txBody>
+          <a:bodyPr anchor="t">
+            <a:normAutofit/>
+          </a:bodyPr>
+          <a:lstStyle/>
+          <a:p>
+            <a:r>
+              <a:rPr lang="en-US" sz="1600" dirty="0"/>
+              <a:t>We’re given a game board and the superpositions calculated for each square printed below.</a:t>
+            </a:r>
+          </a:p>
+          <a:p>
+            <a:r>
+              <a:rPr lang="en-US" sz="1600" dirty="0"/>
+              <a:t>The higher the number the more likely a ship is located there.</a:t>
+            </a:r>
+          </a:p>
+          <a:p>
+            <a:r>
+              <a:rPr lang="en-US" sz="1600" dirty="0"/>
+              <a:t>At the start of a game it’s statically more likely that the ships will be touching the center of the board.</a:t>
+            </a:r>
+          </a:p>
+        </p:txBody>
+      </p:sp>
+      <p:pic>
+        <p:nvPicPr>
+          <p:cNvPr id="16" name="Picture 15">
+            <a:extLst>
+              <a:ext uri="{FF2B5EF4-FFF2-40B4-BE49-F238E27FC236}">
+                <a16:creationId xmlns:a16="http://schemas.microsoft.com/office/drawing/2014/main" id="{16152E31-AECB-4BE3-A8AF-4DCFC108DC40}"/>
+              </a:ext>
+            </a:extLst>
+          </p:cNvPr>
+          <p:cNvPicPr>
+            <a:picLocks noChangeAspect="1"/>
+          </p:cNvPicPr>
+          <p:nvPr/>
+        </p:nvPicPr>
+        <p:blipFill>
+          <a:blip r:embed="rId3"/>
+          <a:stretch>
+            <a:fillRect/>
+          </a:stretch>
+        </p:blipFill>
+        <p:spPr>
+          <a:xfrm>
+            <a:off x="5261052" y="0"/>
+            <a:ext cx="5975195" cy="6858000"/>
+          </a:xfrm>
+          <a:prstGeom prst="rect">
+            <a:avLst/>
+          </a:prstGeom>
+        </p:spPr>
+      </p:pic>
+    </p:spTree>
+    <p:extLst>
+      <p:ext uri="{BB962C8B-B14F-4D97-AF65-F5344CB8AC3E}">
+        <p14:creationId xmlns:p14="http://schemas.microsoft.com/office/powerpoint/2010/main" val="578254657"/>
+      </p:ext>
+    </p:extLst>
+  </p:cSld>
+  <p:clrMapOvr>
+    <a:masterClrMapping/>
+  </p:clrMapOvr>
+</p:sld>
+</file>
+
+<file path=ppt/slides/slide8.xml><?xml version="1.0" encoding="utf-8"?>
+<p:sld xmlns:a="http://schemas.openxmlformats.org/drawingml/2006/main" xmlns:r="http://schemas.openxmlformats.org/officeDocument/2006/relationships" xmlns:p="http://schemas.openxmlformats.org/presentationml/2006/main">
+  <p:cSld>
+    <p:bg>
+      <p:bgPr>
+        <a:blipFill>
+          <a:blip r:embed="rId2"/>
+          <a:stretch/>
+        </a:blipFill>
+        <a:effectLst/>
+      </p:bgPr>
+    </p:bg>
+    <p:spTree>
+      <p:nvGrpSpPr>
+        <p:cNvPr id="1" name=""/>
+        <p:cNvGrpSpPr/>
+        <p:nvPr/>
+      </p:nvGrpSpPr>
+      <p:grpSpPr>
+        <a:xfrm>
+          <a:off x="0" y="0"/>
+          <a:ext cx="0" cy="0"/>
+          <a:chOff x="0" y="0"/>
+          <a:chExt cx="0" cy="0"/>
+        </a:xfrm>
+      </p:grpSpPr>
+      <p:sp>
+        <p:nvSpPr>
+          <p:cNvPr id="2" name="Title 1">
+            <a:extLst>
+              <a:ext uri="{FF2B5EF4-FFF2-40B4-BE49-F238E27FC236}">
+                <a16:creationId xmlns:a16="http://schemas.microsoft.com/office/drawing/2014/main" id="{D4496D4E-19E5-4D6C-B5C8-E532F1EB9514}"/>
+              </a:ext>
+            </a:extLst>
+          </p:cNvPr>
+          <p:cNvSpPr>
+            <a:spLocks noGrp="1"/>
+          </p:cNvSpPr>
+          <p:nvPr>
+            <p:ph type="title"/>
+          </p:nvPr>
+        </p:nvSpPr>
+        <p:spPr>
+          <a:xfrm>
+            <a:off x="685800" y="495300"/>
+            <a:ext cx="3771899" cy="666750"/>
+          </a:xfrm>
+        </p:spPr>
+        <p:txBody>
+          <a:bodyPr anchor="b">
+            <a:normAutofit/>
+          </a:bodyPr>
+          <a:lstStyle/>
+          <a:p>
+            <a:r>
+              <a:rPr lang="en-US" sz="2400" dirty="0"/>
+              <a:t>Output Example:</a:t>
+            </a:r>
+          </a:p>
+        </p:txBody>
+      </p:sp>
+      <p:sp>
+        <p:nvSpPr>
+          <p:cNvPr id="33" name="Content Placeholder 18">
+            <a:extLst>
+              <a:ext uri="{FF2B5EF4-FFF2-40B4-BE49-F238E27FC236}">
+                <a16:creationId xmlns:a16="http://schemas.microsoft.com/office/drawing/2014/main" id="{CB4AF501-EF7C-4C53-B129-9095E0B6A5EF}"/>
+              </a:ext>
+            </a:extLst>
+          </p:cNvPr>
+          <p:cNvSpPr>
+            <a:spLocks noGrp="1"/>
+          </p:cNvSpPr>
+          <p:nvPr>
+            <p:ph idx="1"/>
+          </p:nvPr>
+        </p:nvSpPr>
+        <p:spPr>
+          <a:xfrm>
+            <a:off x="685800" y="1397000"/>
+            <a:ext cx="3771899" cy="5073650"/>
+          </a:xfrm>
+        </p:spPr>
+        <p:txBody>
+          <a:bodyPr anchor="t">
+            <a:normAutofit/>
+          </a:bodyPr>
+          <a:lstStyle/>
+          <a:p>
+            <a:r>
+              <a:rPr lang="en-US" sz="1600" dirty="0"/>
+              <a:t>We took a shot at f5, which resulted in a hit!</a:t>
+            </a:r>
+          </a:p>
+          <a:p>
+            <a:r>
+              <a:rPr lang="en-US" sz="1600" dirty="0"/>
+              <a:t>The board shows us a hit with an ‘X’ and the probability board gets updated with new calculations. </a:t>
+            </a:r>
+          </a:p>
+        </p:txBody>
+      </p:sp>
+      <p:pic>
+        <p:nvPicPr>
+          <p:cNvPr id="3" name="Picture 2">
+            <a:extLst>
+              <a:ext uri="{FF2B5EF4-FFF2-40B4-BE49-F238E27FC236}">
+                <a16:creationId xmlns:a16="http://schemas.microsoft.com/office/drawing/2014/main" id="{F1CC93E7-B272-4722-B250-30B8CFE7507D}"/>
+              </a:ext>
+            </a:extLst>
+          </p:cNvPr>
+          <p:cNvPicPr>
+            <a:picLocks noChangeAspect="1"/>
+          </p:cNvPicPr>
+          <p:nvPr/>
+        </p:nvPicPr>
+        <p:blipFill>
+          <a:blip r:embed="rId3"/>
+          <a:stretch>
+            <a:fillRect/>
+          </a:stretch>
+        </p:blipFill>
+        <p:spPr>
+          <a:xfrm>
+            <a:off x="5246620" y="0"/>
+            <a:ext cx="5610359" cy="6858000"/>
+          </a:xfrm>
+          <a:prstGeom prst="rect">
+            <a:avLst/>
+          </a:prstGeom>
+        </p:spPr>
+      </p:pic>
+    </p:spTree>
+    <p:extLst>
+      <p:ext uri="{BB962C8B-B14F-4D97-AF65-F5344CB8AC3E}">
+        <p14:creationId xmlns:p14="http://schemas.microsoft.com/office/powerpoint/2010/main" val="628849221"/>
+      </p:ext>
+    </p:extLst>
+  </p:cSld>
+  <p:clrMapOvr>
+    <a:masterClrMapping/>
+  </p:clrMapOvr>
+</p:sld>
+</file>
+
+<file path=ppt/slides/slide9.xml><?xml version="1.0" encoding="utf-8"?>
+<p:sld xmlns:a="http://schemas.openxmlformats.org/drawingml/2006/main" xmlns:r="http://schemas.openxmlformats.org/officeDocument/2006/relationships" xmlns:p="http://schemas.openxmlformats.org/presentationml/2006/main">
+  <p:cSld>
+    <p:bg>
+      <p:bgPr>
+        <a:blipFill>
+          <a:blip r:embed="rId2"/>
+          <a:stretch/>
+        </a:blipFill>
+        <a:effectLst/>
+      </p:bgPr>
+    </p:bg>
+    <p:spTree>
+      <p:nvGrpSpPr>
+        <p:cNvPr id="1" name=""/>
+        <p:cNvGrpSpPr/>
+        <p:nvPr/>
+      </p:nvGrpSpPr>
+      <p:grpSpPr>
+        <a:xfrm>
+          <a:off x="0" y="0"/>
+          <a:ext cx="0" cy="0"/>
+          <a:chOff x="0" y="0"/>
+          <a:chExt cx="0" cy="0"/>
+        </a:xfrm>
+      </p:grpSpPr>
+      <p:sp>
+        <p:nvSpPr>
+          <p:cNvPr id="2" name="Title 1">
+            <a:extLst>
+              <a:ext uri="{FF2B5EF4-FFF2-40B4-BE49-F238E27FC236}">
+                <a16:creationId xmlns:a16="http://schemas.microsoft.com/office/drawing/2014/main" id="{D4496D4E-19E5-4D6C-B5C8-E532F1EB9514}"/>
+              </a:ext>
+            </a:extLst>
+          </p:cNvPr>
+          <p:cNvSpPr>
+            <a:spLocks noGrp="1"/>
+          </p:cNvSpPr>
+          <p:nvPr>
+            <p:ph type="title"/>
+          </p:nvPr>
+        </p:nvSpPr>
+        <p:spPr>
+          <a:xfrm>
+            <a:off x="685800" y="495300"/>
+            <a:ext cx="3771899" cy="666750"/>
+          </a:xfrm>
+        </p:spPr>
+        <p:txBody>
+          <a:bodyPr anchor="b">
+            <a:normAutofit/>
+          </a:bodyPr>
+          <a:lstStyle/>
+          <a:p>
+            <a:r>
+              <a:rPr lang="en-US" sz="2400" dirty="0"/>
+              <a:t>Output Example:</a:t>
+            </a:r>
+          </a:p>
+        </p:txBody>
+      </p:sp>
+      <p:sp>
+        <p:nvSpPr>
+          <p:cNvPr id="33" name="Content Placeholder 18">
+            <a:extLst>
+              <a:ext uri="{FF2B5EF4-FFF2-40B4-BE49-F238E27FC236}">
+                <a16:creationId xmlns:a16="http://schemas.microsoft.com/office/drawing/2014/main" id="{CB4AF501-EF7C-4C53-B129-9095E0B6A5EF}"/>
+              </a:ext>
+            </a:extLst>
+          </p:cNvPr>
+          <p:cNvSpPr>
+            <a:spLocks noGrp="1"/>
+          </p:cNvSpPr>
+          <p:nvPr>
+            <p:ph idx="1"/>
+          </p:nvPr>
+        </p:nvSpPr>
+        <p:spPr>
+          <a:xfrm>
+            <a:off x="685800" y="1397000"/>
+            <a:ext cx="3771899" cy="4889500"/>
+          </a:xfrm>
+        </p:spPr>
+        <p:txBody>
+          <a:bodyPr anchor="t">
+            <a:normAutofit/>
+          </a:bodyPr>
+          <a:lstStyle/>
+          <a:p>
+            <a:r>
+              <a:rPr lang="en-US" sz="1600" dirty="0"/>
+              <a:t>We got a bit lucky and managed to sink the first ship in our first three shots. </a:t>
+            </a:r>
+          </a:p>
+          <a:p>
+            <a:r>
+              <a:rPr lang="en-US" sz="1600" dirty="0"/>
+              <a:t>The console tells us which of the ships have been destroyed so far.</a:t>
+            </a:r>
+          </a:p>
+          <a:p>
+            <a:r>
+              <a:rPr lang="en-US" sz="1600" dirty="0"/>
+              <a:t>The average probability drastically dropped because we’re no longer searching for five ships, but four.</a:t>
+            </a:r>
+          </a:p>
+          <a:p>
+            <a:r>
+              <a:rPr lang="en-US" sz="1600" dirty="0"/>
+              <a:t>It looks like our next shot should be aimed towards near f7.</a:t>
+            </a:r>
+          </a:p>
+        </p:txBody>
+      </p:sp>
+      <p:pic>
+        <p:nvPicPr>
+          <p:cNvPr id="4" name="Picture 3">
+            <a:extLst>
+              <a:ext uri="{FF2B5EF4-FFF2-40B4-BE49-F238E27FC236}">
+                <a16:creationId xmlns:a16="http://schemas.microsoft.com/office/drawing/2014/main" id="{FBA0B01B-698A-42AC-9956-CB90FF7A3D7D}"/>
+              </a:ext>
+            </a:extLst>
+          </p:cNvPr>
+          <p:cNvPicPr>
+            <a:picLocks noChangeAspect="1"/>
+          </p:cNvPicPr>
+          <p:nvPr/>
+        </p:nvPicPr>
+        <p:blipFill>
+          <a:blip r:embed="rId3"/>
+          <a:stretch>
+            <a:fillRect/>
+          </a:stretch>
+        </p:blipFill>
+        <p:spPr>
+          <a:xfrm>
+            <a:off x="5246620" y="0"/>
+            <a:ext cx="5280191" cy="6858000"/>
+          </a:xfrm>
+          <a:prstGeom prst="rect">
+            <a:avLst/>
+          </a:prstGeom>
+        </p:spPr>
+      </p:pic>
+    </p:spTree>
+    <p:extLst>
+      <p:ext uri="{BB962C8B-B14F-4D97-AF65-F5344CB8AC3E}">
+        <p14:creationId xmlns:p14="http://schemas.microsoft.com/office/powerpoint/2010/main" val="4113088337"/>
       </p:ext>
     </p:extLst>
   </p:cSld>

</xml_diff>